<commit_message>
Scatter plot added and ppt updated
</commit_message>
<xml_diff>
--- a/Used Cars - Data Exploration.pptx
+++ b/Used Cars - Data Exploration.pptx
@@ -307,7 +307,7 @@
           <a:p>
             <a:fld id="{160B0382-327C-4847-A1B4-0923C4F93505}" type="datetimeFigureOut">
               <a:rPr lang="es-CL" smtClean="0"/>
-              <a:t>22-02-2023</a:t>
+              <a:t>28-02-2023</a:t>
             </a:fld>
             <a:endParaRPr lang="es-CL"/>
           </a:p>
@@ -477,7 +477,7 @@
           <a:p>
             <a:fld id="{160B0382-327C-4847-A1B4-0923C4F93505}" type="datetimeFigureOut">
               <a:rPr lang="es-CL" smtClean="0"/>
-              <a:t>22-02-2023</a:t>
+              <a:t>28-02-2023</a:t>
             </a:fld>
             <a:endParaRPr lang="es-CL"/>
           </a:p>
@@ -698,7 +698,7 @@
           <a:p>
             <a:fld id="{160B0382-327C-4847-A1B4-0923C4F93505}" type="datetimeFigureOut">
               <a:rPr lang="es-CL" smtClean="0"/>
-              <a:t>22-02-2023</a:t>
+              <a:t>28-02-2023</a:t>
             </a:fld>
             <a:endParaRPr lang="es-CL"/>
           </a:p>
@@ -909,7 +909,7 @@
           <a:p>
             <a:fld id="{160B0382-327C-4847-A1B4-0923C4F93505}" type="datetimeFigureOut">
               <a:rPr lang="es-CL" smtClean="0"/>
-              <a:t>22-02-2023</a:t>
+              <a:t>28-02-2023</a:t>
             </a:fld>
             <a:endParaRPr lang="es-CL"/>
           </a:p>
@@ -1204,7 +1204,7 @@
           <a:p>
             <a:fld id="{160B0382-327C-4847-A1B4-0923C4F93505}" type="datetimeFigureOut">
               <a:rPr lang="es-CL" smtClean="0"/>
-              <a:t>22-02-2023</a:t>
+              <a:t>28-02-2023</a:t>
             </a:fld>
             <a:endParaRPr lang="es-CL"/>
           </a:p>
@@ -1533,7 +1533,7 @@
           <a:p>
             <a:fld id="{160B0382-327C-4847-A1B4-0923C4F93505}" type="datetimeFigureOut">
               <a:rPr lang="es-CL" smtClean="0"/>
-              <a:t>22-02-2023</a:t>
+              <a:t>28-02-2023</a:t>
             </a:fld>
             <a:endParaRPr lang="es-CL"/>
           </a:p>
@@ -2025,7 +2025,7 @@
           <a:p>
             <a:fld id="{160B0382-327C-4847-A1B4-0923C4F93505}" type="datetimeFigureOut">
               <a:rPr lang="es-CL" smtClean="0"/>
-              <a:t>22-02-2023</a:t>
+              <a:t>28-02-2023</a:t>
             </a:fld>
             <a:endParaRPr lang="es-CL"/>
           </a:p>
@@ -2184,7 +2184,7 @@
           <a:p>
             <a:fld id="{160B0382-327C-4847-A1B4-0923C4F93505}" type="datetimeFigureOut">
               <a:rPr lang="es-CL" smtClean="0"/>
-              <a:t>22-02-2023</a:t>
+              <a:t>28-02-2023</a:t>
             </a:fld>
             <a:endParaRPr lang="es-CL"/>
           </a:p>
@@ -2320,7 +2320,7 @@
           <a:p>
             <a:fld id="{160B0382-327C-4847-A1B4-0923C4F93505}" type="datetimeFigureOut">
               <a:rPr lang="es-CL" smtClean="0"/>
-              <a:t>22-02-2023</a:t>
+              <a:t>28-02-2023</a:t>
             </a:fld>
             <a:endParaRPr lang="es-CL"/>
           </a:p>
@@ -2648,7 +2648,7 @@
           <a:p>
             <a:fld id="{160B0382-327C-4847-A1B4-0923C4F93505}" type="datetimeFigureOut">
               <a:rPr lang="es-CL" smtClean="0"/>
-              <a:t>22-02-2023</a:t>
+              <a:t>28-02-2023</a:t>
             </a:fld>
             <a:endParaRPr lang="es-CL"/>
           </a:p>
@@ -2963,7 +2963,7 @@
           <a:p>
             <a:fld id="{160B0382-327C-4847-A1B4-0923C4F93505}" type="datetimeFigureOut">
               <a:rPr lang="es-CL" smtClean="0"/>
-              <a:t>22-02-2023</a:t>
+              <a:t>28-02-2023</a:t>
             </a:fld>
             <a:endParaRPr lang="es-CL"/>
           </a:p>
@@ -3215,7 +3215,7 @@
           <a:p>
             <a:fld id="{160B0382-327C-4847-A1B4-0923C4F93505}" type="datetimeFigureOut">
               <a:rPr lang="es-CL" smtClean="0"/>
-              <a:t>22-02-2023</a:t>
+              <a:t>28-02-2023</a:t>
             </a:fld>
             <a:endParaRPr lang="es-CL"/>
           </a:p>
@@ -3887,10 +3887,22 @@
               <a:rPr lang="en-US" dirty="0">
                 <a:latin typeface="Rockwell" panose="02060603020205020403" pitchFamily="18" charset="0"/>
               </a:rPr>
-              <a:t>There’s an investigation related to the pricing of certain used car models, specifically those who charge above the recommended MSRP price.</a:t>
-            </a:r>
-          </a:p>
-          <a:p>
+              <a:t>There’s an investigation related to the pricing of car models in relation to their statuses (New or Used).</a:t>
+            </a:r>
+          </a:p>
+          <a:p>
+            <a:r>
+              <a:rPr lang="en-US" dirty="0">
+                <a:latin typeface="Rockwell" panose="02060603020205020403" pitchFamily="18" charset="0"/>
+              </a:rPr>
+              <a:t>In this case we’ll take a look on which brand has the most </a:t>
+            </a:r>
+            <a:r>
+              <a:rPr lang="en-US">
+                <a:latin typeface="Rockwell" panose="02060603020205020403" pitchFamily="18" charset="0"/>
+              </a:rPr>
+              <a:t>appeal weather be used or new</a:t>
+            </a:r>
             <a:endParaRPr lang="en-US" dirty="0">
               <a:latin typeface="Rockwell" panose="02060603020205020403" pitchFamily="18" charset="0"/>
             </a:endParaRPr>

</xml_diff>

<commit_message>
PPT and IPYNB updated
</commit_message>
<xml_diff>
--- a/Used Cars - Data Exploration.pptx
+++ b/Used Cars - Data Exploration.pptx
@@ -307,7 +307,7 @@
           <a:p>
             <a:fld id="{160B0382-327C-4847-A1B4-0923C4F93505}" type="datetimeFigureOut">
               <a:rPr lang="es-CL" smtClean="0"/>
-              <a:t>28-02-2023</a:t>
+              <a:t>15-03-2023</a:t>
             </a:fld>
             <a:endParaRPr lang="es-CL"/>
           </a:p>
@@ -477,7 +477,7 @@
           <a:p>
             <a:fld id="{160B0382-327C-4847-A1B4-0923C4F93505}" type="datetimeFigureOut">
               <a:rPr lang="es-CL" smtClean="0"/>
-              <a:t>28-02-2023</a:t>
+              <a:t>15-03-2023</a:t>
             </a:fld>
             <a:endParaRPr lang="es-CL"/>
           </a:p>
@@ -698,7 +698,7 @@
           <a:p>
             <a:fld id="{160B0382-327C-4847-A1B4-0923C4F93505}" type="datetimeFigureOut">
               <a:rPr lang="es-CL" smtClean="0"/>
-              <a:t>28-02-2023</a:t>
+              <a:t>15-03-2023</a:t>
             </a:fld>
             <a:endParaRPr lang="es-CL"/>
           </a:p>
@@ -909,7 +909,7 @@
           <a:p>
             <a:fld id="{160B0382-327C-4847-A1B4-0923C4F93505}" type="datetimeFigureOut">
               <a:rPr lang="es-CL" smtClean="0"/>
-              <a:t>28-02-2023</a:t>
+              <a:t>15-03-2023</a:t>
             </a:fld>
             <a:endParaRPr lang="es-CL"/>
           </a:p>
@@ -1204,7 +1204,7 @@
           <a:p>
             <a:fld id="{160B0382-327C-4847-A1B4-0923C4F93505}" type="datetimeFigureOut">
               <a:rPr lang="es-CL" smtClean="0"/>
-              <a:t>28-02-2023</a:t>
+              <a:t>15-03-2023</a:t>
             </a:fld>
             <a:endParaRPr lang="es-CL"/>
           </a:p>
@@ -1533,7 +1533,7 @@
           <a:p>
             <a:fld id="{160B0382-327C-4847-A1B4-0923C4F93505}" type="datetimeFigureOut">
               <a:rPr lang="es-CL" smtClean="0"/>
-              <a:t>28-02-2023</a:t>
+              <a:t>15-03-2023</a:t>
             </a:fld>
             <a:endParaRPr lang="es-CL"/>
           </a:p>
@@ -2025,7 +2025,7 @@
           <a:p>
             <a:fld id="{160B0382-327C-4847-A1B4-0923C4F93505}" type="datetimeFigureOut">
               <a:rPr lang="es-CL" smtClean="0"/>
-              <a:t>28-02-2023</a:t>
+              <a:t>15-03-2023</a:t>
             </a:fld>
             <a:endParaRPr lang="es-CL"/>
           </a:p>
@@ -2184,7 +2184,7 @@
           <a:p>
             <a:fld id="{160B0382-327C-4847-A1B4-0923C4F93505}" type="datetimeFigureOut">
               <a:rPr lang="es-CL" smtClean="0"/>
-              <a:t>28-02-2023</a:t>
+              <a:t>15-03-2023</a:t>
             </a:fld>
             <a:endParaRPr lang="es-CL"/>
           </a:p>
@@ -2320,7 +2320,7 @@
           <a:p>
             <a:fld id="{160B0382-327C-4847-A1B4-0923C4F93505}" type="datetimeFigureOut">
               <a:rPr lang="es-CL" smtClean="0"/>
-              <a:t>28-02-2023</a:t>
+              <a:t>15-03-2023</a:t>
             </a:fld>
             <a:endParaRPr lang="es-CL"/>
           </a:p>
@@ -2648,7 +2648,7 @@
           <a:p>
             <a:fld id="{160B0382-327C-4847-A1B4-0923C4F93505}" type="datetimeFigureOut">
               <a:rPr lang="es-CL" smtClean="0"/>
-              <a:t>28-02-2023</a:t>
+              <a:t>15-03-2023</a:t>
             </a:fld>
             <a:endParaRPr lang="es-CL"/>
           </a:p>
@@ -2963,7 +2963,7 @@
           <a:p>
             <a:fld id="{160B0382-327C-4847-A1B4-0923C4F93505}" type="datetimeFigureOut">
               <a:rPr lang="es-CL" smtClean="0"/>
-              <a:t>28-02-2023</a:t>
+              <a:t>15-03-2023</a:t>
             </a:fld>
             <a:endParaRPr lang="es-CL"/>
           </a:p>
@@ -3215,7 +3215,7 @@
           <a:p>
             <a:fld id="{160B0382-327C-4847-A1B4-0923C4F93505}" type="datetimeFigureOut">
               <a:rPr lang="es-CL" smtClean="0"/>
-              <a:t>28-02-2023</a:t>
+              <a:t>15-03-2023</a:t>
             </a:fld>
             <a:endParaRPr lang="es-CL"/>
           </a:p>
@@ -3887,7 +3887,7 @@
               <a:rPr lang="en-US" dirty="0">
                 <a:latin typeface="Rockwell" panose="02060603020205020403" pitchFamily="18" charset="0"/>
               </a:rPr>
-              <a:t>There’s an investigation related to the pricing of car models in relation to their statuses (New or Used).</a:t>
+              <a:t>There’s an survey in relation to a number of car brands in relation to their distribution, pricing , most sold models and overall presence.</a:t>
             </a:r>
           </a:p>
           <a:p>
@@ -3895,14 +3895,50 @@
               <a:rPr lang="en-US" dirty="0">
                 <a:latin typeface="Rockwell" panose="02060603020205020403" pitchFamily="18" charset="0"/>
               </a:rPr>
-              <a:t>In this case we’ll take a look on which brand has the most </a:t>
-            </a:r>
+              <a:t>For this EDA, we are going to obtain the following Insights:</a:t>
+            </a:r>
+          </a:p>
+          <a:p>
+            <a:pPr lvl="1"/>
+            <a:r>
+              <a:rPr lang="en-US" dirty="0">
+                <a:latin typeface="Rockwell" panose="02060603020205020403" pitchFamily="18" charset="0"/>
+              </a:rPr>
+              <a:t>Car distribution</a:t>
+            </a:r>
+          </a:p>
+          <a:p>
+            <a:pPr lvl="1"/>
+            <a:r>
+              <a:rPr lang="en-US" dirty="0">
+                <a:latin typeface="Rockwell" panose="02060603020205020403" pitchFamily="18" charset="0"/>
+              </a:rPr>
+              <a:t>Average pricing</a:t>
+            </a:r>
+          </a:p>
+          <a:p>
+            <a:pPr lvl="1"/>
+            <a:r>
+              <a:rPr lang="en-US" dirty="0">
+                <a:latin typeface="Rockwell" panose="02060603020205020403" pitchFamily="18" charset="0"/>
+              </a:rPr>
+              <a:t>Models sold by brand</a:t>
+            </a:r>
+          </a:p>
+          <a:p>
+            <a:pPr lvl="1"/>
             <a:r>
               <a:rPr lang="en-US">
                 <a:latin typeface="Rockwell" panose="02060603020205020403" pitchFamily="18" charset="0"/>
               </a:rPr>
-              <a:t>appeal weather be used or new</a:t>
-            </a:r>
+              <a:t>Overall presence</a:t>
+            </a:r>
+            <a:endParaRPr lang="en-US" dirty="0">
+              <a:latin typeface="Rockwell" panose="02060603020205020403" pitchFamily="18" charset="0"/>
+            </a:endParaRPr>
+          </a:p>
+          <a:p>
+            <a:pPr lvl="1"/>
             <a:endParaRPr lang="en-US" dirty="0">
               <a:latin typeface="Rockwell" panose="02060603020205020403" pitchFamily="18" charset="0"/>
             </a:endParaRPr>

</xml_diff>